<commit_message>
Updated powerpoint with github link
</commit_message>
<xml_diff>
--- a/Revature_Project1_Presentation.pptx
+++ b/Revature_Project1_Presentation.pptx
@@ -18,7 +18,7 @@
     <p:sldId id="266" r:id="rId12"/>
     <p:sldId id="267" r:id="rId13"/>
     <p:sldId id="268" r:id="rId14"/>
-    <p:sldId id="269" r:id="rId15"/>
+    <p:sldId id="270" r:id="rId15"/>
   </p:sldIdLst>
   <p:sldSz cx="12192000" cy="6858000"/>
   <p:notesSz cx="6858000" cy="9144000"/>
@@ -354,7 +354,7 @@
           <a:p>
             <a:fld id="{FD561705-9995-4ADE-B0E7-3E6B1BBBFE73}" type="datetimeFigureOut">
               <a:rPr lang="en-US" smtClean="0"/>
-              <a:t>2/4/2021</a:t>
+              <a:t>2/5/2021</a:t>
             </a:fld>
             <a:endParaRPr lang="en-US"/>
           </a:p>
@@ -688,7 +688,7 @@
           <a:p>
             <a:fld id="{FD561705-9995-4ADE-B0E7-3E6B1BBBFE73}" type="datetimeFigureOut">
               <a:rPr lang="en-US" smtClean="0"/>
-              <a:t>2/4/2021</a:t>
+              <a:t>2/5/2021</a:t>
             </a:fld>
             <a:endParaRPr lang="en-US"/>
           </a:p>
@@ -966,7 +966,7 @@
           <a:p>
             <a:fld id="{FD561705-9995-4ADE-B0E7-3E6B1BBBFE73}" type="datetimeFigureOut">
               <a:rPr lang="en-US" smtClean="0"/>
-              <a:t>2/4/2021</a:t>
+              <a:t>2/5/2021</a:t>
             </a:fld>
             <a:endParaRPr lang="en-US"/>
           </a:p>
@@ -1534,7 +1534,7 @@
           <a:p>
             <a:fld id="{FD561705-9995-4ADE-B0E7-3E6B1BBBFE73}" type="datetimeFigureOut">
               <a:rPr lang="en-US" smtClean="0"/>
-              <a:t>2/4/2021</a:t>
+              <a:t>2/5/2021</a:t>
             </a:fld>
             <a:endParaRPr lang="en-US"/>
           </a:p>
@@ -1812,7 +1812,7 @@
           <a:p>
             <a:fld id="{FD561705-9995-4ADE-B0E7-3E6B1BBBFE73}" type="datetimeFigureOut">
               <a:rPr lang="en-US" smtClean="0"/>
-              <a:t>2/4/2021</a:t>
+              <a:t>2/5/2021</a:t>
             </a:fld>
             <a:endParaRPr lang="en-US"/>
           </a:p>
@@ -2374,7 +2374,7 @@
           <a:p>
             <a:fld id="{FD561705-9995-4ADE-B0E7-3E6B1BBBFE73}" type="datetimeFigureOut">
               <a:rPr lang="en-US" smtClean="0"/>
-              <a:t>2/4/2021</a:t>
+              <a:t>2/5/2021</a:t>
             </a:fld>
             <a:endParaRPr lang="en-US"/>
           </a:p>
@@ -2701,7 +2701,7 @@
           <a:p>
             <a:fld id="{FD561705-9995-4ADE-B0E7-3E6B1BBBFE73}" type="datetimeFigureOut">
               <a:rPr lang="en-US" smtClean="0"/>
-              <a:t>2/4/2021</a:t>
+              <a:t>2/5/2021</a:t>
             </a:fld>
             <a:endParaRPr lang="en-US"/>
           </a:p>
@@ -2878,7 +2878,7 @@
           <a:p>
             <a:fld id="{FD561705-9995-4ADE-B0E7-3E6B1BBBFE73}" type="datetimeFigureOut">
               <a:rPr lang="en-US" smtClean="0"/>
-              <a:t>2/4/2021</a:t>
+              <a:t>2/5/2021</a:t>
             </a:fld>
             <a:endParaRPr lang="en-US"/>
           </a:p>
@@ -3116,7 +3116,7 @@
           <a:p>
             <a:fld id="{FD561705-9995-4ADE-B0E7-3E6B1BBBFE73}" type="datetimeFigureOut">
               <a:rPr lang="en-US" smtClean="0"/>
-              <a:t>2/4/2021</a:t>
+              <a:t>2/5/2021</a:t>
             </a:fld>
             <a:endParaRPr lang="en-US"/>
           </a:p>
@@ -3316,7 +3316,7 @@
           <a:p>
             <a:fld id="{FD561705-9995-4ADE-B0E7-3E6B1BBBFE73}" type="datetimeFigureOut">
               <a:rPr lang="en-US" smtClean="0"/>
-              <a:t>2/4/2021</a:t>
+              <a:t>2/5/2021</a:t>
             </a:fld>
             <a:endParaRPr lang="en-US"/>
           </a:p>
@@ -3592,7 +3592,7 @@
           <a:p>
             <a:fld id="{FD561705-9995-4ADE-B0E7-3E6B1BBBFE73}" type="datetimeFigureOut">
               <a:rPr lang="en-US" smtClean="0"/>
-              <a:t>2/4/2021</a:t>
+              <a:t>2/5/2021</a:t>
             </a:fld>
             <a:endParaRPr lang="en-US"/>
           </a:p>
@@ -3858,7 +3858,7 @@
           <a:p>
             <a:fld id="{FD561705-9995-4ADE-B0E7-3E6B1BBBFE73}" type="datetimeFigureOut">
               <a:rPr lang="en-US" smtClean="0"/>
-              <a:t>2/4/2021</a:t>
+              <a:t>2/5/2021</a:t>
             </a:fld>
             <a:endParaRPr lang="en-US"/>
           </a:p>
@@ -4232,7 +4232,7 @@
           <a:p>
             <a:fld id="{FD561705-9995-4ADE-B0E7-3E6B1BBBFE73}" type="datetimeFigureOut">
               <a:rPr lang="en-US" smtClean="0"/>
-              <a:t>2/4/2021</a:t>
+              <a:t>2/5/2021</a:t>
             </a:fld>
             <a:endParaRPr lang="en-US"/>
           </a:p>
@@ -4380,7 +4380,7 @@
           <a:p>
             <a:fld id="{FD561705-9995-4ADE-B0E7-3E6B1BBBFE73}" type="datetimeFigureOut">
               <a:rPr lang="en-US" smtClean="0"/>
-              <a:t>2/4/2021</a:t>
+              <a:t>2/5/2021</a:t>
             </a:fld>
             <a:endParaRPr lang="en-US"/>
           </a:p>
@@ -4505,7 +4505,7 @@
           <a:p>
             <a:fld id="{FD561705-9995-4ADE-B0E7-3E6B1BBBFE73}" type="datetimeFigureOut">
               <a:rPr lang="en-US" smtClean="0"/>
-              <a:t>2/4/2021</a:t>
+              <a:t>2/5/2021</a:t>
             </a:fld>
             <a:endParaRPr lang="en-US"/>
           </a:p>
@@ -4790,7 +4790,7 @@
           <a:p>
             <a:fld id="{FD561705-9995-4ADE-B0E7-3E6B1BBBFE73}" type="datetimeFigureOut">
               <a:rPr lang="en-US" smtClean="0"/>
-              <a:t>2/4/2021</a:t>
+              <a:t>2/5/2021</a:t>
             </a:fld>
             <a:endParaRPr lang="en-US"/>
           </a:p>
@@ -5114,7 +5114,7 @@
           <a:p>
             <a:fld id="{FD561705-9995-4ADE-B0E7-3E6B1BBBFE73}" type="datetimeFigureOut">
               <a:rPr lang="en-US" smtClean="0"/>
-              <a:t>2/4/2021</a:t>
+              <a:t>2/5/2021</a:t>
             </a:fld>
             <a:endParaRPr lang="en-US"/>
           </a:p>
@@ -5328,7 +5328,7 @@
           <a:p>
             <a:fld id="{FD561705-9995-4ADE-B0E7-3E6B1BBBFE73}" type="datetimeFigureOut">
               <a:rPr lang="en-US" smtClean="0"/>
-              <a:t>2/4/2021</a:t>
+              <a:t>2/5/2021</a:t>
             </a:fld>
             <a:endParaRPr lang="en-US"/>
           </a:p>
@@ -6813,7 +6813,7 @@
           <p:cNvPr id="2" name="Title 1">
             <a:extLst>
               <a:ext uri="{FF2B5EF4-FFF2-40B4-BE49-F238E27FC236}">
-                <a16:creationId xmlns:a16="http://schemas.microsoft.com/office/drawing/2014/main" id="{C7FD9881-A16A-479C-AF8F-7467A355CA78}"/>
+                <a16:creationId xmlns:a16="http://schemas.microsoft.com/office/drawing/2014/main" id="{7F64550D-0D26-429C-9A5E-9FA2289F9FB3}"/>
               </a:ext>
             </a:extLst>
           </p:cNvPr>
@@ -6836,10 +6836,44 @@
           </a:p>
         </p:txBody>
       </p:sp>
+      <p:sp>
+        <p:nvSpPr>
+          <p:cNvPr id="3" name="Subtitle 2">
+            <a:extLst>
+              <a:ext uri="{FF2B5EF4-FFF2-40B4-BE49-F238E27FC236}">
+                <a16:creationId xmlns:a16="http://schemas.microsoft.com/office/drawing/2014/main" id="{28E72855-D85B-45A3-A347-1F2539FF6247}"/>
+              </a:ext>
+            </a:extLst>
+          </p:cNvPr>
+          <p:cNvSpPr>
+            <a:spLocks noGrp="1"/>
+          </p:cNvSpPr>
+          <p:nvPr>
+            <p:ph type="subTitle" idx="1"/>
+          </p:nvPr>
+        </p:nvSpPr>
+        <p:spPr/>
+        <p:txBody>
+          <a:bodyPr/>
+          <a:lstStyle/>
+          <a:p>
+            <a:r>
+              <a:rPr lang="en-US" dirty="0"/>
+              <a:t>Any questions?</a:t>
+            </a:r>
+          </a:p>
+          <a:p>
+            <a:r>
+              <a:rPr lang="en-US" dirty="0"/>
+              <a:t>https://github.com/APCompEeng/RevatureProject1</a:t>
+            </a:r>
+          </a:p>
+        </p:txBody>
+      </p:sp>
     </p:spTree>
     <p:extLst>
       <p:ext uri="{BB962C8B-B14F-4D97-AF65-F5344CB8AC3E}">
-        <p14:creationId xmlns:p14="http://schemas.microsoft.com/office/powerpoint/2010/main" val="2437213159"/>
+        <p14:creationId xmlns:p14="http://schemas.microsoft.com/office/powerpoint/2010/main" val="36705718"/>
       </p:ext>
     </p:extLst>
   </p:cSld>

</xml_diff>